<commit_message>
add week 3 material
</commit_message>
<xml_diff>
--- a/slides/Python_Workshop_2.pptx
+++ b/slides/Python_Workshop_2.pptx
@@ -6998,7 +6998,7 @@
         <p:spPr>
           <a:xfrm>
             <a:off x="838200" y="1690688"/>
-            <a:ext cx="9834664" cy="646331"/>
+            <a:ext cx="9834664" cy="1754326"/>
           </a:xfrm>
           <a:prstGeom prst="rect">
             <a:avLst/>
@@ -7011,9 +7011,12 @@
           </a:bodyPr>
           <a:lstStyle/>
           <a:p>
+            <a:pPr marL="742950" indent="-742950">
+              <a:buAutoNum type="arabicPeriod"/>
+            </a:pPr>
             <a:r>
               <a:rPr lang="en-US" altLang="zh-TW" sz="3600" b="1" dirty="0"/>
-              <a:t>1. Spec – search number from </a:t>
+              <a:t>Spec – search number from </a:t>
             </a:r>
             <a:r>
               <a:rPr lang="en-US" altLang="zh-TW" sz="3600" b="1" dirty="0">
@@ -7025,7 +7028,22 @@
             </a:r>
             <a:r>
               <a:rPr lang="en-US" altLang="zh-TW" sz="3600" b="1" dirty="0"/>
-              <a:t> sequence </a:t>
+              <a:t> sequence</a:t>
+            </a:r>
+          </a:p>
+          <a:p>
+            <a:endParaRPr lang="en-US" altLang="zh-TW" sz="3600" b="1" dirty="0"/>
+          </a:p>
+          <a:p>
+            <a:r>
+              <a:rPr lang="en-US" altLang="zh-TW" b="1" dirty="0"/>
+              <a:t>Input: target integer </a:t>
+            </a:r>
+          </a:p>
+          <a:p>
+            <a:r>
+              <a:rPr lang="en-US" altLang="zh-TW" b="1" dirty="0"/>
+              <a:t>Output: target index</a:t>
             </a:r>
             <a:endParaRPr lang="zh-TW" altLang="en-US" b="1" dirty="0"/>
           </a:p>
@@ -7616,7 +7634,19 @@
             <a:pPr algn="ctr"/>
             <a:r>
               <a:rPr lang="en-US" altLang="zh-TW" sz="6000" b="1" dirty="0"/>
-              <a:t>[2,5,7,15,22,</a:t>
+              <a:t>[2,5,7,</a:t>
+            </a:r>
+            <a:r>
+              <a:rPr lang="en-US" altLang="zh-TW" sz="6000" b="1" dirty="0">
+                <a:highlight>
+                  <a:srgbClr val="FFFF00"/>
+                </a:highlight>
+              </a:rPr>
+              <a:t>15</a:t>
+            </a:r>
+            <a:r>
+              <a:rPr lang="en-US" altLang="zh-TW" sz="6000" b="1" dirty="0"/>
+              <a:t>,     [22,</a:t>
             </a:r>
             <a:r>
               <a:rPr lang="en-US" altLang="zh-TW" sz="6000" b="1" dirty="0">

</xml_diff>